<commit_message>
Updated meme for vscode
</commit_message>
<xml_diff>
--- a/Compiled Cmdlets/Compiled_Cmdlets.pptx
+++ b/Compiled Cmdlets/Compiled_Cmdlets.pptx
@@ -801,7 +801,7 @@
               <a:rPr lang="en-US" smtClean="0">
                 <a:latin typeface="Segoe UI" pitchFamily="34" charset="0"/>
               </a:rPr>
-              <a:t>1/12/2019 10:20 AM</a:t>
+              <a:t>1/19/2019 11:43 PM</a:t>
             </a:fld>
             <a:endParaRPr lang="en-US" dirty="0">
               <a:latin typeface="Segoe UI" pitchFamily="34" charset="0"/>
@@ -1079,7 +1079,7 @@
           <a:p>
             <a:fld id="{386CE63F-9E7F-4C04-9D0D-FCA25A8E9E86}" type="datetime8">
               <a:rPr lang="en-US" smtClean="0"/>
-              <a:t>1/12/2019 10:20 AM</a:t>
+              <a:t>1/19/2019 11:43 PM</a:t>
             </a:fld>
             <a:endParaRPr lang="en-US" dirty="0"/>
           </a:p>
@@ -1462,7 +1462,7 @@
           <a:p>
             <a:fld id="{386CE63F-9E7F-4C04-9D0D-FCA25A8E9E86}" type="datetime8">
               <a:rPr lang="en-US" smtClean="0"/>
-              <a:t>1/12/2019 10:20 AM</a:t>
+              <a:t>1/19/2019 11:43 PM</a:t>
             </a:fld>
             <a:endParaRPr lang="en-US" dirty="0"/>
           </a:p>
@@ -19185,42 +19185,6 @@
           </a:p>
         </p:txBody>
       </p:sp>
-      <p:pic>
-        <p:nvPicPr>
-          <p:cNvPr id="5" name="Picture 4">
-            <a:extLst>
-              <a:ext uri="{FF2B5EF4-FFF2-40B4-BE49-F238E27FC236}">
-                <a16:creationId xmlns:a16="http://schemas.microsoft.com/office/drawing/2014/main" id="{EABDA7A9-CE4C-4F97-93AE-5839D499FF3A}"/>
-              </a:ext>
-            </a:extLst>
-          </p:cNvPr>
-          <p:cNvPicPr>
-            <a:picLocks noChangeAspect="1"/>
-          </p:cNvPicPr>
-          <p:nvPr/>
-        </p:nvPicPr>
-        <p:blipFill>
-          <a:blip r:embed="rId2">
-            <a:extLst>
-              <a:ext uri="{837473B0-CC2E-450A-ABE3-18F120FF3D39}">
-                <a1611:picAttrSrcUrl xmlns:a1611="http://schemas.microsoft.com/office/drawing/2016/11/main" r:id="rId3"/>
-              </a:ext>
-            </a:extLst>
-          </a:blip>
-          <a:stretch>
-            <a:fillRect/>
-          </a:stretch>
-        </p:blipFill>
-        <p:spPr>
-          <a:xfrm>
-            <a:off x="5904062" y="1136436"/>
-            <a:ext cx="1718838" cy="1712124"/>
-          </a:xfrm>
-          <a:prstGeom prst="rect">
-            <a:avLst/>
-          </a:prstGeom>
-        </p:spPr>
-      </p:pic>
       <p:sp>
         <p:nvSpPr>
           <p:cNvPr id="6" name="TextBox 5">
@@ -19251,7 +19215,7 @@
           <a:p>
             <a:r>
               <a:rPr lang="en-US" sz="900" dirty="0">
-                <a:hlinkClick r:id="rId3" tooltip="https://en.wikipedia.org/wiki/File:Visual_Studio_Code_1.18_icon.svg"/>
+                <a:hlinkClick r:id="rId2" tooltip="https://en.wikipedia.org/wiki/File:Visual_Studio_Code_1.18_icon.svg"/>
               </a:rPr>
               <a:t>This Photo</a:t>
             </a:r>
@@ -19261,7 +19225,7 @@
             </a:r>
             <a:r>
               <a:rPr lang="en-US" sz="900" dirty="0">
-                <a:hlinkClick r:id="rId4" tooltip="https://creativecommons.org/licenses/by-sa/3.0/"/>
+                <a:hlinkClick r:id="rId3" tooltip="https://creativecommons.org/licenses/by-sa/3.0/"/>
               </a:rPr>
               <a:t>CC BY-SA</a:t>
             </a:r>
@@ -19269,42 +19233,6 @@
           </a:p>
         </p:txBody>
       </p:sp>
-      <p:pic>
-        <p:nvPicPr>
-          <p:cNvPr id="8" name="Picture 7">
-            <a:extLst>
-              <a:ext uri="{FF2B5EF4-FFF2-40B4-BE49-F238E27FC236}">
-                <a16:creationId xmlns:a16="http://schemas.microsoft.com/office/drawing/2014/main" id="{9AA07A8A-8DFC-4F82-8BEA-489344D9A6CE}"/>
-              </a:ext>
-            </a:extLst>
-          </p:cNvPr>
-          <p:cNvPicPr>
-            <a:picLocks noChangeAspect="1"/>
-          </p:cNvPicPr>
-          <p:nvPr/>
-        </p:nvPicPr>
-        <p:blipFill>
-          <a:blip r:embed="rId5">
-            <a:extLst>
-              <a:ext uri="{837473B0-CC2E-450A-ABE3-18F120FF3D39}">
-                <a1611:picAttrSrcUrl xmlns:a1611="http://schemas.microsoft.com/office/drawing/2016/11/main" r:id="rId6"/>
-              </a:ext>
-            </a:extLst>
-          </a:blip>
-          <a:stretch>
-            <a:fillRect/>
-          </a:stretch>
-        </p:blipFill>
-        <p:spPr>
-          <a:xfrm>
-            <a:off x="4317158" y="2848560"/>
-            <a:ext cx="1437715" cy="1437715"/>
-          </a:xfrm>
-          <a:prstGeom prst="rect">
-            <a:avLst/>
-          </a:prstGeom>
-        </p:spPr>
-      </p:pic>
       <p:sp>
         <p:nvSpPr>
           <p:cNvPr id="9" name="TextBox 8">
@@ -19335,7 +19263,7 @@
           <a:p>
             <a:r>
               <a:rPr lang="en-US" sz="900" dirty="0">
-                <a:hlinkClick r:id="rId6" tooltip="https://en.wikipedia.org/wiki/.NET_Framework"/>
+                <a:hlinkClick r:id="rId4" tooltip="https://en.wikipedia.org/wiki/.NET_Framework"/>
               </a:rPr>
               <a:t>This Photo</a:t>
             </a:r>
@@ -19345,7 +19273,7 @@
             </a:r>
             <a:r>
               <a:rPr lang="en-US" sz="900" dirty="0">
-                <a:hlinkClick r:id="rId4" tooltip="https://creativecommons.org/licenses/by-sa/3.0/"/>
+                <a:hlinkClick r:id="rId3" tooltip="https://creativecommons.org/licenses/by-sa/3.0/"/>
               </a:rPr>
               <a:t>CC BY-SA</a:t>
             </a:r>
@@ -19353,6 +19281,36 @@
           </a:p>
         </p:txBody>
       </p:sp>
+      <p:pic>
+        <p:nvPicPr>
+          <p:cNvPr id="7" name="Picture 6">
+            <a:extLst>
+              <a:ext uri="{FF2B5EF4-FFF2-40B4-BE49-F238E27FC236}">
+                <a16:creationId xmlns:a16="http://schemas.microsoft.com/office/drawing/2014/main" id="{3BE85E2C-DA0F-46F4-81F7-29D8AF4C2386}"/>
+              </a:ext>
+            </a:extLst>
+          </p:cNvPr>
+          <p:cNvPicPr>
+            <a:picLocks noChangeAspect="1"/>
+          </p:cNvPicPr>
+          <p:nvPr/>
+        </p:nvPicPr>
+        <p:blipFill>
+          <a:blip r:embed="rId5"/>
+          <a:stretch>
+            <a:fillRect/>
+          </a:stretch>
+        </p:blipFill>
+        <p:spPr>
+          <a:xfrm>
+            <a:off x="5783249" y="734199"/>
+            <a:ext cx="6096000" cy="5238750"/>
+          </a:xfrm>
+          <a:prstGeom prst="rect">
+            <a:avLst/>
+          </a:prstGeom>
+        </p:spPr>
+      </p:pic>
     </p:spTree>
     <p:extLst>
       <p:ext uri="{BB962C8B-B14F-4D97-AF65-F5344CB8AC3E}">
@@ -21425,20 +21383,20 @@
 </file>
 
 <file path=customXml/item1.xml><?xml version="1.0" encoding="utf-8"?>
-<p:properties xmlns:p="http://schemas.microsoft.com/office/2006/metadata/properties" xmlns:xsi="http://www.w3.org/2001/XMLSchema-instance" xmlns:pc="http://schemas.microsoft.com/office/infopath/2007/PartnerControls">
-  <documentManagement>
-    <MetaData xmlns="a666da93-78c4-4b7e-aa17-0268193e6a1c" xsi:nil="true"/>
-  </documentManagement>
-</p:properties>
-</file>
-
-<file path=customXml/item2.xml><?xml version="1.0" encoding="utf-8"?>
 <?mso-contentType ?>
 <FormTemplates xmlns="http://schemas.microsoft.com/sharepoint/v3/contenttype/forms">
   <Display>DocumentLibraryForm</Display>
   <Edit>DocumentLibraryForm</Edit>
   <New>DocumentLibraryForm</New>
 </FormTemplates>
+</file>
+
+<file path=customXml/item2.xml><?xml version="1.0" encoding="utf-8"?>
+<p:properties xmlns:p="http://schemas.microsoft.com/office/2006/metadata/properties" xmlns:xsi="http://www.w3.org/2001/XMLSchema-instance" xmlns:pc="http://schemas.microsoft.com/office/infopath/2007/PartnerControls">
+  <documentManagement>
+    <MetaData xmlns="a666da93-78c4-4b7e-aa17-0268193e6a1c" xsi:nil="true"/>
+  </documentManagement>
+</p:properties>
 </file>
 
 <file path=customXml/item3.xml><?xml version="1.0" encoding="utf-8"?>
@@ -21600,6 +21558,14 @@
 </file>
 
 <file path=customXml/itemProps1.xml><?xml version="1.0" encoding="utf-8"?>
+<ds:datastoreItem xmlns:ds="http://schemas.openxmlformats.org/officeDocument/2006/customXml" ds:itemID="{758FDAC0-319D-4A54-8D8E-1D42CB1F8004}">
+  <ds:schemaRefs>
+    <ds:schemaRef ds:uri="http://schemas.microsoft.com/sharepoint/v3/contenttype/forms"/>
+  </ds:schemaRefs>
+</ds:datastoreItem>
+</file>
+
+<file path=customXml/itemProps2.xml><?xml version="1.0" encoding="utf-8"?>
 <ds:datastoreItem xmlns:ds="http://schemas.openxmlformats.org/officeDocument/2006/customXml" ds:itemID="{F990F116-B58F-4255-B05B-DA3808E0E5C6}">
   <ds:schemaRefs>
     <ds:schemaRef ds:uri="a666da93-78c4-4b7e-aa17-0268193e6a1c"/>
@@ -21611,14 +21577,6 @@
     <ds:schemaRef ds:uri="http://purl.org/dc/dcmitype/"/>
     <ds:schemaRef ds:uri="http://purl.org/dc/elements/1.1/"/>
     <ds:schemaRef ds:uri="http://schemas.openxmlformats.org/package/2006/metadata/core-properties"/>
-  </ds:schemaRefs>
-</ds:datastoreItem>
-</file>
-
-<file path=customXml/itemProps2.xml><?xml version="1.0" encoding="utf-8"?>
-<ds:datastoreItem xmlns:ds="http://schemas.openxmlformats.org/officeDocument/2006/customXml" ds:itemID="{758FDAC0-319D-4A54-8D8E-1D42CB1F8004}">
-  <ds:schemaRefs>
-    <ds:schemaRef ds:uri="http://schemas.microsoft.com/sharepoint/v3/contenttype/forms"/>
   </ds:schemaRefs>
 </ds:datastoreItem>
 </file>

</xml_diff>